<commit_message>
Update content on camera2 api with opencv processing
</commit_message>
<xml_diff>
--- a/PPT/카메라 기반 실시간 영상처리 기능을 포함한 안드로이드 앱 개발 03.pptx
+++ b/PPT/카메라 기반 실시간 영상처리 기능을 포함한 안드로이드 앱 개발 03.pptx
@@ -5,7 +5,7 @@
     <p:sldMasterId id="2147483648" r:id="rId1"/>
   </p:sldMasterIdLst>
   <p:notesMasterIdLst>
-    <p:notesMasterId r:id="rId17"/>
+    <p:notesMasterId r:id="rId24"/>
   </p:notesMasterIdLst>
   <p:sldIdLst>
     <p:sldId id="256" r:id="rId2"/>
@@ -22,7 +22,14 @@
     <p:sldId id="354" r:id="rId13"/>
     <p:sldId id="345" r:id="rId14"/>
     <p:sldId id="346" r:id="rId15"/>
-    <p:sldId id="262" r:id="rId16"/>
+    <p:sldId id="357" r:id="rId16"/>
+    <p:sldId id="360" r:id="rId17"/>
+    <p:sldId id="361" r:id="rId18"/>
+    <p:sldId id="355" r:id="rId19"/>
+    <p:sldId id="356" r:id="rId20"/>
+    <p:sldId id="358" r:id="rId21"/>
+    <p:sldId id="359" r:id="rId22"/>
+    <p:sldId id="262" r:id="rId23"/>
   </p:sldIdLst>
   <p:sldSz cx="12192000" cy="6858000"/>
   <p:notesSz cx="6858000" cy="9144000"/>
@@ -4461,10 +4468,9 @@
           <a:lstStyle/>
           <a:p>
             <a:r>
-              <a:rPr lang="en-US" altLang="ko-KR" dirty="0"/>
-              <a:t>Import OpenCV</a:t>
-            </a:r>
-            <a:endParaRPr lang="ko-KR" altLang="en-US" dirty="0"/>
+              <a:rPr lang="ko-KR" altLang="en-US" dirty="0"/>
+              <a:t>예제 코드</a:t>
+            </a:r>
           </a:p>
         </p:txBody>
       </p:sp>
@@ -4662,10 +4668,9 @@
           <a:lstStyle/>
           <a:p>
             <a:r>
-              <a:rPr lang="en-US" altLang="ko-KR" dirty="0"/>
-              <a:t>Import OpenCV</a:t>
-            </a:r>
-            <a:endParaRPr lang="ko-KR" altLang="en-US" dirty="0"/>
+              <a:rPr lang="ko-KR" altLang="en-US" dirty="0"/>
+              <a:t>예제 코드</a:t>
+            </a:r>
           </a:p>
         </p:txBody>
       </p:sp>
@@ -4893,10 +4898,9 @@
           <a:lstStyle/>
           <a:p>
             <a:r>
-              <a:rPr lang="en-US" altLang="ko-KR" dirty="0"/>
-              <a:t>Import OpenCV</a:t>
-            </a:r>
-            <a:endParaRPr lang="ko-KR" altLang="en-US" dirty="0"/>
+              <a:rPr lang="ko-KR" altLang="en-US" dirty="0"/>
+              <a:t>예제 코드</a:t>
+            </a:r>
           </a:p>
         </p:txBody>
       </p:sp>
@@ -5323,10 +5327,9 @@
           <a:lstStyle/>
           <a:p>
             <a:r>
-              <a:rPr lang="en-US" altLang="ko-KR" dirty="0"/>
-              <a:t>Import OpenCV</a:t>
-            </a:r>
-            <a:endParaRPr lang="ko-KR" altLang="en-US" dirty="0"/>
+              <a:rPr lang="ko-KR" altLang="en-US" dirty="0"/>
+              <a:t>예제 코드</a:t>
+            </a:r>
           </a:p>
         </p:txBody>
       </p:sp>
@@ -5421,36 +5424,8 @@
               <a:buChar char="•"/>
             </a:pPr>
             <a:r>
-              <a:rPr lang="en-US" altLang="ko-KR" sz="2400" dirty="0"/>
-              <a:t>Native</a:t>
-            </a:r>
-            <a:r>
-              <a:rPr lang="ko-KR" altLang="en-US" sz="2400" dirty="0"/>
-              <a:t> </a:t>
-            </a:r>
-            <a:r>
-              <a:rPr lang="en-US" altLang="ko-KR" sz="2400" dirty="0"/>
-              <a:t>development</a:t>
-            </a:r>
-            <a:r>
-              <a:rPr lang="ko-KR" altLang="en-US" sz="2400" dirty="0"/>
-              <a:t> </a:t>
-            </a:r>
-            <a:r>
-              <a:rPr lang="en-US" altLang="ko-KR" sz="2400" dirty="0"/>
-              <a:t>kit(NDK) &amp; </a:t>
-            </a:r>
-            <a:r>
               <a:rPr lang="en-US" altLang="ko-KR" sz="2400" dirty="0" err="1"/>
-              <a:t>CMake</a:t>
-            </a:r>
-            <a:r>
-              <a:rPr lang="en-US" altLang="ko-KR" sz="2400" dirty="0"/>
-              <a:t> </a:t>
-            </a:r>
-            <a:r>
-              <a:rPr lang="ko-KR" altLang="en-US" sz="2400" dirty="0"/>
-              <a:t>설치</a:t>
+              <a:t>OnPreviewListener</a:t>
             </a:r>
             <a:endParaRPr lang="en-US" altLang="ko-KR" sz="2400" dirty="0"/>
           </a:p>
@@ -5460,81 +5435,73 @@
               <a:buChar char="•"/>
             </a:pPr>
             <a:r>
-              <a:rPr lang="en-US" altLang="ko-KR" dirty="0"/>
-              <a:t>Android </a:t>
-            </a:r>
-            <a:r>
-              <a:rPr lang="en-US" altLang="ko-KR" dirty="0" err="1"/>
-              <a:t>studi</a:t>
-            </a:r>
-            <a:r>
               <a:rPr lang="ko-KR" altLang="en-US" dirty="0"/>
-              <a:t>의 </a:t>
-            </a:r>
-            <a:r>
-              <a:rPr lang="en-US" altLang="ko-KR" dirty="0"/>
-              <a:t>SDK Manager </a:t>
-            </a:r>
-            <a:r>
-              <a:rPr lang="ko-KR" altLang="en-US" dirty="0"/>
-              <a:t>열기</a:t>
+              <a:t>이미지를 불러와 처리하는 이벤트 명시</a:t>
             </a:r>
             <a:endParaRPr lang="en-US" altLang="ko-KR" dirty="0"/>
           </a:p>
         </p:txBody>
       </p:sp>
-      <p:sp>
-        <p:nvSpPr>
-          <p:cNvPr id="14" name="직사각형 13">
-            <a:extLst>
-              <a:ext uri="{FF2B5EF4-FFF2-40B4-BE49-F238E27FC236}">
-                <a16:creationId xmlns:a16="http://schemas.microsoft.com/office/drawing/2014/main" id="{BF038113-DFF8-4841-B0E9-CD549C532006}"/>
-              </a:ext>
-            </a:extLst>
-          </p:cNvPr>
-          <p:cNvSpPr/>
+      <p:pic>
+        <p:nvPicPr>
+          <p:cNvPr id="6" name="그림 5">
+            <a:extLst>
+              <a:ext uri="{FF2B5EF4-FFF2-40B4-BE49-F238E27FC236}">
+                <a16:creationId xmlns:a16="http://schemas.microsoft.com/office/drawing/2014/main" id="{A98DA626-43B1-424D-83C4-BF9E8FB8EA92}"/>
+              </a:ext>
+            </a:extLst>
+          </p:cNvPr>
+          <p:cNvPicPr>
+            <a:picLocks noChangeAspect="1"/>
+          </p:cNvPicPr>
           <p:nvPr/>
-        </p:nvSpPr>
+        </p:nvPicPr>
+        <p:blipFill>
+          <a:blip r:embed="rId2"/>
+          <a:stretch>
+            <a:fillRect/>
+          </a:stretch>
+        </p:blipFill>
         <p:spPr>
           <a:xfrm>
-            <a:off x="5237398" y="2247069"/>
-            <a:ext cx="267537" cy="230462"/>
+            <a:off x="1152839" y="2327812"/>
+            <a:ext cx="3922355" cy="3600064"/>
           </a:xfrm>
           <a:prstGeom prst="rect">
             <a:avLst/>
           </a:prstGeom>
-          <a:noFill/>
-          <a:ln w="38100">
-            <a:solidFill>
-              <a:srgbClr val="FF0000"/>
-            </a:solidFill>
-          </a:ln>
         </p:spPr>
-        <p:style>
-          <a:lnRef idx="2">
-            <a:schemeClr val="accent1">
-              <a:shade val="50000"/>
-            </a:schemeClr>
-          </a:lnRef>
-          <a:fillRef idx="1">
-            <a:schemeClr val="accent1"/>
-          </a:fillRef>
-          <a:effectRef idx="0">
-            <a:schemeClr val="accent1"/>
-          </a:effectRef>
-          <a:fontRef idx="minor">
-            <a:schemeClr val="lt1"/>
-          </a:fontRef>
-        </p:style>
-        <p:txBody>
-          <a:bodyPr rtlCol="0" anchor="ctr"/>
-          <a:lstStyle/>
-          <a:p>
-            <a:pPr algn="ctr"/>
-            <a:endParaRPr lang="ko-KR" altLang="en-US" dirty="0"/>
-          </a:p>
-        </p:txBody>
-      </p:sp>
+      </p:pic>
+      <p:pic>
+        <p:nvPicPr>
+          <p:cNvPr id="8" name="그림 7">
+            <a:extLst>
+              <a:ext uri="{FF2B5EF4-FFF2-40B4-BE49-F238E27FC236}">
+                <a16:creationId xmlns:a16="http://schemas.microsoft.com/office/drawing/2014/main" id="{49F2EC26-9853-42B1-A8F2-09153BAC3BF5}"/>
+              </a:ext>
+            </a:extLst>
+          </p:cNvPr>
+          <p:cNvPicPr>
+            <a:picLocks noChangeAspect="1"/>
+          </p:cNvPicPr>
+          <p:nvPr/>
+        </p:nvPicPr>
+        <p:blipFill>
+          <a:blip r:embed="rId3"/>
+          <a:stretch>
+            <a:fillRect/>
+          </a:stretch>
+        </p:blipFill>
+        <p:spPr>
+          <a:xfrm>
+            <a:off x="5940974" y="1649128"/>
+            <a:ext cx="5550129" cy="4937231"/>
+          </a:xfrm>
+          <a:prstGeom prst="rect">
+            <a:avLst/>
+          </a:prstGeom>
+        </p:spPr>
+      </p:pic>
     </p:spTree>
     <p:extLst>
       <p:ext uri="{BB962C8B-B14F-4D97-AF65-F5344CB8AC3E}">
@@ -5567,10 +5534,140 @@
       </p:grpSpPr>
       <p:sp>
         <p:nvSpPr>
-          <p:cNvPr id="2" name="TextBox 1">
-            <a:extLst>
-              <a:ext uri="{FF2B5EF4-FFF2-40B4-BE49-F238E27FC236}">
-                <a16:creationId xmlns:a16="http://schemas.microsoft.com/office/drawing/2014/main" id="{49C98DDA-1AF3-434F-8176-F68A64814597}"/>
+          <p:cNvPr id="2" name="제목 1">
+            <a:extLst>
+              <a:ext uri="{FF2B5EF4-FFF2-40B4-BE49-F238E27FC236}">
+                <a16:creationId xmlns:a16="http://schemas.microsoft.com/office/drawing/2014/main" id="{93EC9EF1-25B2-470B-8958-64B218A29447}"/>
+              </a:ext>
+            </a:extLst>
+          </p:cNvPr>
+          <p:cNvSpPr>
+            <a:spLocks noGrp="1"/>
+          </p:cNvSpPr>
+          <p:nvPr>
+            <p:ph type="title"/>
+          </p:nvPr>
+        </p:nvSpPr>
+        <p:spPr/>
+        <p:txBody>
+          <a:bodyPr>
+            <a:normAutofit fontScale="90000"/>
+          </a:bodyPr>
+          <a:lstStyle/>
+          <a:p>
+            <a:r>
+              <a:rPr lang="en-US" altLang="ko-KR" dirty="0"/>
+              <a:t>Camera API </a:t>
+            </a:r>
+            <a:r>
+              <a:rPr lang="ko-KR" altLang="en-US" dirty="0"/>
+              <a:t>기반 </a:t>
+            </a:r>
+            <a:r>
+              <a:rPr lang="en-US" altLang="ko-KR" dirty="0"/>
+              <a:t>OpenCV </a:t>
+            </a:r>
+            <a:r>
+              <a:rPr lang="ko-KR" altLang="en-US" dirty="0"/>
+              <a:t>영상처리</a:t>
+            </a:r>
+          </a:p>
+        </p:txBody>
+      </p:sp>
+      <p:sp>
+        <p:nvSpPr>
+          <p:cNvPr id="3" name="내용 개체 틀 2">
+            <a:extLst>
+              <a:ext uri="{FF2B5EF4-FFF2-40B4-BE49-F238E27FC236}">
+                <a16:creationId xmlns:a16="http://schemas.microsoft.com/office/drawing/2014/main" id="{3AE5EED4-91BA-44E1-9311-944BA85AD85D}"/>
+              </a:ext>
+            </a:extLst>
+          </p:cNvPr>
+          <p:cNvSpPr>
+            <a:spLocks noGrp="1"/>
+          </p:cNvSpPr>
+          <p:nvPr>
+            <p:ph idx="1"/>
+          </p:nvPr>
+        </p:nvSpPr>
+        <p:spPr/>
+        <p:txBody>
+          <a:bodyPr>
+            <a:normAutofit fontScale="85000" lnSpcReduction="20000"/>
+          </a:bodyPr>
+          <a:lstStyle/>
+          <a:p>
+            <a:r>
+              <a:rPr lang="ko-KR" altLang="en-US" dirty="0"/>
+              <a:t>예제 코드</a:t>
+            </a:r>
+          </a:p>
+        </p:txBody>
+      </p:sp>
+      <p:sp>
+        <p:nvSpPr>
+          <p:cNvPr id="4" name="텍스트 개체 틀 3">
+            <a:extLst>
+              <a:ext uri="{FF2B5EF4-FFF2-40B4-BE49-F238E27FC236}">
+                <a16:creationId xmlns:a16="http://schemas.microsoft.com/office/drawing/2014/main" id="{92BAEDC0-2F4D-4109-AAF6-73297C38FC55}"/>
+              </a:ext>
+            </a:extLst>
+          </p:cNvPr>
+          <p:cNvSpPr>
+            <a:spLocks noGrp="1"/>
+          </p:cNvSpPr>
+          <p:nvPr>
+            <p:ph type="body" sz="quarter" idx="13"/>
+          </p:nvPr>
+        </p:nvSpPr>
+        <p:spPr/>
+        <p:txBody>
+          <a:bodyPr/>
+          <a:lstStyle/>
+          <a:p>
+            <a:r>
+              <a:rPr lang="en-US" altLang="ko-KR" dirty="0"/>
+              <a:t>02</a:t>
+            </a:r>
+            <a:endParaRPr lang="ko-KR" altLang="en-US" dirty="0"/>
+          </a:p>
+        </p:txBody>
+      </p:sp>
+      <p:sp>
+        <p:nvSpPr>
+          <p:cNvPr id="15" name="슬라이드 번호 개체 틀 14">
+            <a:extLst>
+              <a:ext uri="{FF2B5EF4-FFF2-40B4-BE49-F238E27FC236}">
+                <a16:creationId xmlns:a16="http://schemas.microsoft.com/office/drawing/2014/main" id="{79B9229E-D7CD-40C2-B26F-0BF4AC1E9E93}"/>
+              </a:ext>
+            </a:extLst>
+          </p:cNvPr>
+          <p:cNvSpPr>
+            <a:spLocks noGrp="1"/>
+          </p:cNvSpPr>
+          <p:nvPr>
+            <p:ph type="sldNum" sz="quarter" idx="12"/>
+          </p:nvPr>
+        </p:nvSpPr>
+        <p:spPr/>
+        <p:txBody>
+          <a:bodyPr/>
+          <a:lstStyle/>
+          <a:p>
+            <a:fld id="{28033542-72CD-49C1-9B51-668B00668B43}" type="slidenum">
+              <a:rPr lang="ko-KR" altLang="en-US" smtClean="0"/>
+              <a:t>15</a:t>
+            </a:fld>
+            <a:endParaRPr lang="ko-KR" altLang="en-US"/>
+          </a:p>
+        </p:txBody>
+      </p:sp>
+      <p:sp>
+        <p:nvSpPr>
+          <p:cNvPr id="13" name="TextBox 12">
+            <a:extLst>
+              <a:ext uri="{FF2B5EF4-FFF2-40B4-BE49-F238E27FC236}">
+                <a16:creationId xmlns:a16="http://schemas.microsoft.com/office/drawing/2014/main" id="{E2D893D9-3930-4552-9C6B-0E0B88029121}"/>
               </a:ext>
             </a:extLst>
           </p:cNvPr>
@@ -5579,8 +5676,8 @@
         </p:nvSpPr>
         <p:spPr>
           <a:xfrm>
-            <a:off x="4696082" y="2705725"/>
-            <a:ext cx="2821606" cy="1446550"/>
+            <a:off x="700897" y="1140473"/>
+            <a:ext cx="10368722" cy="461665"/>
           </a:xfrm>
           <a:prstGeom prst="rect">
             <a:avLst/>
@@ -5588,32 +5685,1050 @@
           <a:noFill/>
         </p:spPr>
         <p:txBody>
-          <a:bodyPr wrap="none" rtlCol="0">
+          <a:bodyPr wrap="square" rtlCol="0">
             <a:spAutoFit/>
           </a:bodyPr>
           <a:lstStyle/>
           <a:p>
-            <a:pPr algn="ctr"/>
-            <a:r>
-              <a:rPr lang="en-US" altLang="ko-KR" sz="8800" b="1" dirty="0">
-                <a:solidFill>
-                  <a:srgbClr val="595959"/>
-                </a:solidFill>
-              </a:rPr>
-              <a:t>Q&amp;A</a:t>
-            </a:r>
-            <a:endParaRPr lang="ko-KR" altLang="en-US" sz="8800" b="1" dirty="0">
-              <a:solidFill>
-                <a:srgbClr val="595959"/>
-              </a:solidFill>
-            </a:endParaRPr>
-          </a:p>
-        </p:txBody>
-      </p:sp>
+            <a:pPr marL="285750" indent="-285750">
+              <a:buFont typeface="Arial" panose="020B0604020202020204" pitchFamily="34" charset="0"/>
+              <a:buChar char="•"/>
+            </a:pPr>
+            <a:r>
+              <a:rPr lang="en-US" altLang="ko-KR" sz="2400" dirty="0" err="1"/>
+              <a:t>SurfaceImageView</a:t>
+            </a:r>
+            <a:endParaRPr lang="en-US" altLang="ko-KR" sz="2400" dirty="0"/>
+          </a:p>
+        </p:txBody>
+      </p:sp>
+      <p:pic>
+        <p:nvPicPr>
+          <p:cNvPr id="6" name="그림 5">
+            <a:extLst>
+              <a:ext uri="{FF2B5EF4-FFF2-40B4-BE49-F238E27FC236}">
+                <a16:creationId xmlns:a16="http://schemas.microsoft.com/office/drawing/2014/main" id="{13673B23-466C-4DB3-8C32-C2F0C8A27158}"/>
+              </a:ext>
+            </a:extLst>
+          </p:cNvPr>
+          <p:cNvPicPr>
+            <a:picLocks noChangeAspect="1"/>
+          </p:cNvPicPr>
+          <p:nvPr/>
+        </p:nvPicPr>
+        <p:blipFill>
+          <a:blip r:embed="rId2"/>
+          <a:stretch>
+            <a:fillRect/>
+          </a:stretch>
+        </p:blipFill>
+        <p:spPr>
+          <a:xfrm>
+            <a:off x="1655680" y="2471351"/>
+            <a:ext cx="3547802" cy="2870628"/>
+          </a:xfrm>
+          <a:prstGeom prst="rect">
+            <a:avLst/>
+          </a:prstGeom>
+        </p:spPr>
+      </p:pic>
+      <p:pic>
+        <p:nvPicPr>
+          <p:cNvPr id="9" name="그림 8">
+            <a:extLst>
+              <a:ext uri="{FF2B5EF4-FFF2-40B4-BE49-F238E27FC236}">
+                <a16:creationId xmlns:a16="http://schemas.microsoft.com/office/drawing/2014/main" id="{9DCF71FF-478A-4E90-96FA-0FA459838822}"/>
+              </a:ext>
+            </a:extLst>
+          </p:cNvPr>
+          <p:cNvPicPr>
+            <a:picLocks noChangeAspect="1"/>
+          </p:cNvPicPr>
+          <p:nvPr/>
+        </p:nvPicPr>
+        <p:blipFill>
+          <a:blip r:embed="rId3"/>
+          <a:stretch>
+            <a:fillRect/>
+          </a:stretch>
+        </p:blipFill>
+        <p:spPr>
+          <a:xfrm>
+            <a:off x="6096000" y="1970069"/>
+            <a:ext cx="4644529" cy="3989437"/>
+          </a:xfrm>
+          <a:prstGeom prst="rect">
+            <a:avLst/>
+          </a:prstGeom>
+        </p:spPr>
+      </p:pic>
     </p:spTree>
     <p:extLst>
       <p:ext uri="{BB962C8B-B14F-4D97-AF65-F5344CB8AC3E}">
-        <p14:creationId xmlns:p14="http://schemas.microsoft.com/office/powerpoint/2010/main" val="143865349"/>
+        <p14:creationId xmlns:p14="http://schemas.microsoft.com/office/powerpoint/2010/main" val="2605669042"/>
+      </p:ext>
+    </p:extLst>
+  </p:cSld>
+  <p:clrMapOvr>
+    <a:masterClrMapping/>
+  </p:clrMapOvr>
+</p:sld>
+</file>
+
+<file path=ppt/slides/slide16.xml><?xml version="1.0" encoding="utf-8"?>
+<p:sld xmlns:a="http://schemas.openxmlformats.org/drawingml/2006/main" xmlns:r="http://schemas.openxmlformats.org/officeDocument/2006/relationships" xmlns:p="http://schemas.openxmlformats.org/presentationml/2006/main">
+  <p:cSld>
+    <p:spTree>
+      <p:nvGrpSpPr>
+        <p:cNvPr id="1" name=""/>
+        <p:cNvGrpSpPr/>
+        <p:nvPr/>
+      </p:nvGrpSpPr>
+      <p:grpSpPr>
+        <a:xfrm>
+          <a:off x="0" y="0"/>
+          <a:ext cx="0" cy="0"/>
+          <a:chOff x="0" y="0"/>
+          <a:chExt cx="0" cy="0"/>
+        </a:xfrm>
+      </p:grpSpPr>
+      <p:sp>
+        <p:nvSpPr>
+          <p:cNvPr id="2" name="제목 1">
+            <a:extLst>
+              <a:ext uri="{FF2B5EF4-FFF2-40B4-BE49-F238E27FC236}">
+                <a16:creationId xmlns:a16="http://schemas.microsoft.com/office/drawing/2014/main" id="{93EC9EF1-25B2-470B-8958-64B218A29447}"/>
+              </a:ext>
+            </a:extLst>
+          </p:cNvPr>
+          <p:cNvSpPr>
+            <a:spLocks noGrp="1"/>
+          </p:cNvSpPr>
+          <p:nvPr>
+            <p:ph type="title"/>
+          </p:nvPr>
+        </p:nvSpPr>
+        <p:spPr/>
+        <p:txBody>
+          <a:bodyPr>
+            <a:normAutofit fontScale="90000"/>
+          </a:bodyPr>
+          <a:lstStyle/>
+          <a:p>
+            <a:r>
+              <a:rPr lang="en-US" altLang="ko-KR" dirty="0"/>
+              <a:t>Camera API </a:t>
+            </a:r>
+            <a:r>
+              <a:rPr lang="ko-KR" altLang="en-US" dirty="0"/>
+              <a:t>기반 </a:t>
+            </a:r>
+            <a:r>
+              <a:rPr lang="en-US" altLang="ko-KR" dirty="0"/>
+              <a:t>OpenCV </a:t>
+            </a:r>
+            <a:r>
+              <a:rPr lang="ko-KR" altLang="en-US" dirty="0"/>
+              <a:t>영상처리</a:t>
+            </a:r>
+          </a:p>
+        </p:txBody>
+      </p:sp>
+      <p:sp>
+        <p:nvSpPr>
+          <p:cNvPr id="3" name="내용 개체 틀 2">
+            <a:extLst>
+              <a:ext uri="{FF2B5EF4-FFF2-40B4-BE49-F238E27FC236}">
+                <a16:creationId xmlns:a16="http://schemas.microsoft.com/office/drawing/2014/main" id="{3AE5EED4-91BA-44E1-9311-944BA85AD85D}"/>
+              </a:ext>
+            </a:extLst>
+          </p:cNvPr>
+          <p:cNvSpPr>
+            <a:spLocks noGrp="1"/>
+          </p:cNvSpPr>
+          <p:nvPr>
+            <p:ph idx="1"/>
+          </p:nvPr>
+        </p:nvSpPr>
+        <p:spPr/>
+        <p:txBody>
+          <a:bodyPr>
+            <a:normAutofit fontScale="85000" lnSpcReduction="20000"/>
+          </a:bodyPr>
+          <a:lstStyle/>
+          <a:p>
+            <a:r>
+              <a:rPr lang="ko-KR" altLang="en-US" dirty="0"/>
+              <a:t>예제 코드</a:t>
+            </a:r>
+          </a:p>
+        </p:txBody>
+      </p:sp>
+      <p:sp>
+        <p:nvSpPr>
+          <p:cNvPr id="4" name="텍스트 개체 틀 3">
+            <a:extLst>
+              <a:ext uri="{FF2B5EF4-FFF2-40B4-BE49-F238E27FC236}">
+                <a16:creationId xmlns:a16="http://schemas.microsoft.com/office/drawing/2014/main" id="{92BAEDC0-2F4D-4109-AAF6-73297C38FC55}"/>
+              </a:ext>
+            </a:extLst>
+          </p:cNvPr>
+          <p:cNvSpPr>
+            <a:spLocks noGrp="1"/>
+          </p:cNvSpPr>
+          <p:nvPr>
+            <p:ph type="body" sz="quarter" idx="13"/>
+          </p:nvPr>
+        </p:nvSpPr>
+        <p:spPr/>
+        <p:txBody>
+          <a:bodyPr/>
+          <a:lstStyle/>
+          <a:p>
+            <a:r>
+              <a:rPr lang="en-US" altLang="ko-KR" dirty="0"/>
+              <a:t>02</a:t>
+            </a:r>
+            <a:endParaRPr lang="ko-KR" altLang="en-US" dirty="0"/>
+          </a:p>
+        </p:txBody>
+      </p:sp>
+      <p:sp>
+        <p:nvSpPr>
+          <p:cNvPr id="15" name="슬라이드 번호 개체 틀 14">
+            <a:extLst>
+              <a:ext uri="{FF2B5EF4-FFF2-40B4-BE49-F238E27FC236}">
+                <a16:creationId xmlns:a16="http://schemas.microsoft.com/office/drawing/2014/main" id="{79B9229E-D7CD-40C2-B26F-0BF4AC1E9E93}"/>
+              </a:ext>
+            </a:extLst>
+          </p:cNvPr>
+          <p:cNvSpPr>
+            <a:spLocks noGrp="1"/>
+          </p:cNvSpPr>
+          <p:nvPr>
+            <p:ph type="sldNum" sz="quarter" idx="12"/>
+          </p:nvPr>
+        </p:nvSpPr>
+        <p:spPr/>
+        <p:txBody>
+          <a:bodyPr/>
+          <a:lstStyle/>
+          <a:p>
+            <a:fld id="{28033542-72CD-49C1-9B51-668B00668B43}" type="slidenum">
+              <a:rPr lang="ko-KR" altLang="en-US" smtClean="0"/>
+              <a:t>16</a:t>
+            </a:fld>
+            <a:endParaRPr lang="ko-KR" altLang="en-US"/>
+          </a:p>
+        </p:txBody>
+      </p:sp>
+      <p:sp>
+        <p:nvSpPr>
+          <p:cNvPr id="13" name="TextBox 12">
+            <a:extLst>
+              <a:ext uri="{FF2B5EF4-FFF2-40B4-BE49-F238E27FC236}">
+                <a16:creationId xmlns:a16="http://schemas.microsoft.com/office/drawing/2014/main" id="{E2D893D9-3930-4552-9C6B-0E0B88029121}"/>
+              </a:ext>
+            </a:extLst>
+          </p:cNvPr>
+          <p:cNvSpPr txBox="1"/>
+          <p:nvPr/>
+        </p:nvSpPr>
+        <p:spPr>
+          <a:xfrm>
+            <a:off x="700897" y="1140473"/>
+            <a:ext cx="10368722" cy="461665"/>
+          </a:xfrm>
+          <a:prstGeom prst="rect">
+            <a:avLst/>
+          </a:prstGeom>
+          <a:noFill/>
+        </p:spPr>
+        <p:txBody>
+          <a:bodyPr wrap="square" rtlCol="0">
+            <a:spAutoFit/>
+          </a:bodyPr>
+          <a:lstStyle/>
+          <a:p>
+            <a:pPr marL="285750" indent="-285750">
+              <a:buFont typeface="Arial" panose="020B0604020202020204" pitchFamily="34" charset="0"/>
+              <a:buChar char="•"/>
+            </a:pPr>
+            <a:r>
+              <a:rPr lang="en-US" altLang="ko-KR" sz="2400" dirty="0" err="1"/>
+              <a:t>ImageProcessing</a:t>
+            </a:r>
+            <a:endParaRPr lang="en-US" altLang="ko-KR" sz="2400" dirty="0"/>
+          </a:p>
+        </p:txBody>
+      </p:sp>
+      <p:pic>
+        <p:nvPicPr>
+          <p:cNvPr id="7" name="그림 6">
+            <a:extLst>
+              <a:ext uri="{FF2B5EF4-FFF2-40B4-BE49-F238E27FC236}">
+                <a16:creationId xmlns:a16="http://schemas.microsoft.com/office/drawing/2014/main" id="{B332F046-58F0-43A2-82A0-DBE988DAB6D4}"/>
+              </a:ext>
+            </a:extLst>
+          </p:cNvPr>
+          <p:cNvPicPr>
+            <a:picLocks noChangeAspect="1"/>
+          </p:cNvPicPr>
+          <p:nvPr/>
+        </p:nvPicPr>
+        <p:blipFill>
+          <a:blip r:embed="rId2"/>
+          <a:stretch>
+            <a:fillRect/>
+          </a:stretch>
+        </p:blipFill>
+        <p:spPr>
+          <a:xfrm>
+            <a:off x="3476625" y="2098460"/>
+            <a:ext cx="5238750" cy="3476625"/>
+          </a:xfrm>
+          <a:prstGeom prst="rect">
+            <a:avLst/>
+          </a:prstGeom>
+        </p:spPr>
+      </p:pic>
+    </p:spTree>
+    <p:extLst>
+      <p:ext uri="{BB962C8B-B14F-4D97-AF65-F5344CB8AC3E}">
+        <p14:creationId xmlns:p14="http://schemas.microsoft.com/office/powerpoint/2010/main" val="1408010014"/>
+      </p:ext>
+    </p:extLst>
+  </p:cSld>
+  <p:clrMapOvr>
+    <a:masterClrMapping/>
+  </p:clrMapOvr>
+</p:sld>
+</file>
+
+<file path=ppt/slides/slide17.xml><?xml version="1.0" encoding="utf-8"?>
+<p:sld xmlns:a="http://schemas.openxmlformats.org/drawingml/2006/main" xmlns:r="http://schemas.openxmlformats.org/officeDocument/2006/relationships" xmlns:p="http://schemas.openxmlformats.org/presentationml/2006/main">
+  <p:cSld>
+    <p:spTree>
+      <p:nvGrpSpPr>
+        <p:cNvPr id="1" name=""/>
+        <p:cNvGrpSpPr/>
+        <p:nvPr/>
+      </p:nvGrpSpPr>
+      <p:grpSpPr>
+        <a:xfrm>
+          <a:off x="0" y="0"/>
+          <a:ext cx="0" cy="0"/>
+          <a:chOff x="0" y="0"/>
+          <a:chExt cx="0" cy="0"/>
+        </a:xfrm>
+      </p:grpSpPr>
+      <p:sp>
+        <p:nvSpPr>
+          <p:cNvPr id="2" name="제목 1">
+            <a:extLst>
+              <a:ext uri="{FF2B5EF4-FFF2-40B4-BE49-F238E27FC236}">
+                <a16:creationId xmlns:a16="http://schemas.microsoft.com/office/drawing/2014/main" id="{93EC9EF1-25B2-470B-8958-64B218A29447}"/>
+              </a:ext>
+            </a:extLst>
+          </p:cNvPr>
+          <p:cNvSpPr>
+            <a:spLocks noGrp="1"/>
+          </p:cNvSpPr>
+          <p:nvPr>
+            <p:ph type="title"/>
+          </p:nvPr>
+        </p:nvSpPr>
+        <p:spPr/>
+        <p:txBody>
+          <a:bodyPr>
+            <a:normAutofit fontScale="90000"/>
+          </a:bodyPr>
+          <a:lstStyle/>
+          <a:p>
+            <a:r>
+              <a:rPr lang="en-US" altLang="ko-KR" dirty="0"/>
+              <a:t>Camera API </a:t>
+            </a:r>
+            <a:r>
+              <a:rPr lang="ko-KR" altLang="en-US" dirty="0"/>
+              <a:t>기반 </a:t>
+            </a:r>
+            <a:r>
+              <a:rPr lang="en-US" altLang="ko-KR" dirty="0"/>
+              <a:t>OpenCV </a:t>
+            </a:r>
+            <a:r>
+              <a:rPr lang="ko-KR" altLang="en-US" dirty="0"/>
+              <a:t>영상처리</a:t>
+            </a:r>
+          </a:p>
+        </p:txBody>
+      </p:sp>
+      <p:sp>
+        <p:nvSpPr>
+          <p:cNvPr id="3" name="내용 개체 틀 2">
+            <a:extLst>
+              <a:ext uri="{FF2B5EF4-FFF2-40B4-BE49-F238E27FC236}">
+                <a16:creationId xmlns:a16="http://schemas.microsoft.com/office/drawing/2014/main" id="{3AE5EED4-91BA-44E1-9311-944BA85AD85D}"/>
+              </a:ext>
+            </a:extLst>
+          </p:cNvPr>
+          <p:cNvSpPr>
+            <a:spLocks noGrp="1"/>
+          </p:cNvSpPr>
+          <p:nvPr>
+            <p:ph idx="1"/>
+          </p:nvPr>
+        </p:nvSpPr>
+        <p:spPr/>
+        <p:txBody>
+          <a:bodyPr>
+            <a:normAutofit fontScale="85000" lnSpcReduction="20000"/>
+          </a:bodyPr>
+          <a:lstStyle/>
+          <a:p>
+            <a:r>
+              <a:rPr lang="ko-KR" altLang="en-US" dirty="0"/>
+              <a:t>예제 코드</a:t>
+            </a:r>
+          </a:p>
+        </p:txBody>
+      </p:sp>
+      <p:sp>
+        <p:nvSpPr>
+          <p:cNvPr id="4" name="텍스트 개체 틀 3">
+            <a:extLst>
+              <a:ext uri="{FF2B5EF4-FFF2-40B4-BE49-F238E27FC236}">
+                <a16:creationId xmlns:a16="http://schemas.microsoft.com/office/drawing/2014/main" id="{92BAEDC0-2F4D-4109-AAF6-73297C38FC55}"/>
+              </a:ext>
+            </a:extLst>
+          </p:cNvPr>
+          <p:cNvSpPr>
+            <a:spLocks noGrp="1"/>
+          </p:cNvSpPr>
+          <p:nvPr>
+            <p:ph type="body" sz="quarter" idx="13"/>
+          </p:nvPr>
+        </p:nvSpPr>
+        <p:spPr/>
+        <p:txBody>
+          <a:bodyPr/>
+          <a:lstStyle/>
+          <a:p>
+            <a:r>
+              <a:rPr lang="en-US" altLang="ko-KR" dirty="0"/>
+              <a:t>02</a:t>
+            </a:r>
+            <a:endParaRPr lang="ko-KR" altLang="en-US" dirty="0"/>
+          </a:p>
+        </p:txBody>
+      </p:sp>
+      <p:sp>
+        <p:nvSpPr>
+          <p:cNvPr id="15" name="슬라이드 번호 개체 틀 14">
+            <a:extLst>
+              <a:ext uri="{FF2B5EF4-FFF2-40B4-BE49-F238E27FC236}">
+                <a16:creationId xmlns:a16="http://schemas.microsoft.com/office/drawing/2014/main" id="{79B9229E-D7CD-40C2-B26F-0BF4AC1E9E93}"/>
+              </a:ext>
+            </a:extLst>
+          </p:cNvPr>
+          <p:cNvSpPr>
+            <a:spLocks noGrp="1"/>
+          </p:cNvSpPr>
+          <p:nvPr>
+            <p:ph type="sldNum" sz="quarter" idx="12"/>
+          </p:nvPr>
+        </p:nvSpPr>
+        <p:spPr/>
+        <p:txBody>
+          <a:bodyPr/>
+          <a:lstStyle/>
+          <a:p>
+            <a:fld id="{28033542-72CD-49C1-9B51-668B00668B43}" type="slidenum">
+              <a:rPr lang="ko-KR" altLang="en-US" smtClean="0"/>
+              <a:t>17</a:t>
+            </a:fld>
+            <a:endParaRPr lang="ko-KR" altLang="en-US"/>
+          </a:p>
+        </p:txBody>
+      </p:sp>
+      <p:sp>
+        <p:nvSpPr>
+          <p:cNvPr id="13" name="TextBox 12">
+            <a:extLst>
+              <a:ext uri="{FF2B5EF4-FFF2-40B4-BE49-F238E27FC236}">
+                <a16:creationId xmlns:a16="http://schemas.microsoft.com/office/drawing/2014/main" id="{E2D893D9-3930-4552-9C6B-0E0B88029121}"/>
+              </a:ext>
+            </a:extLst>
+          </p:cNvPr>
+          <p:cNvSpPr txBox="1"/>
+          <p:nvPr/>
+        </p:nvSpPr>
+        <p:spPr>
+          <a:xfrm>
+            <a:off x="700897" y="1140473"/>
+            <a:ext cx="10368722" cy="461665"/>
+          </a:xfrm>
+          <a:prstGeom prst="rect">
+            <a:avLst/>
+          </a:prstGeom>
+          <a:noFill/>
+        </p:spPr>
+        <p:txBody>
+          <a:bodyPr wrap="square" rtlCol="0">
+            <a:spAutoFit/>
+          </a:bodyPr>
+          <a:lstStyle/>
+          <a:p>
+            <a:pPr marL="285750" indent="-285750">
+              <a:buFont typeface="Arial" panose="020B0604020202020204" pitchFamily="34" charset="0"/>
+              <a:buChar char="•"/>
+            </a:pPr>
+            <a:r>
+              <a:rPr lang="en-US" altLang="ko-KR" sz="2400" dirty="0"/>
+              <a:t>Native code</a:t>
+            </a:r>
+          </a:p>
+        </p:txBody>
+      </p:sp>
+      <p:pic>
+        <p:nvPicPr>
+          <p:cNvPr id="6" name="그림 5">
+            <a:extLst>
+              <a:ext uri="{FF2B5EF4-FFF2-40B4-BE49-F238E27FC236}">
+                <a16:creationId xmlns:a16="http://schemas.microsoft.com/office/drawing/2014/main" id="{047CD6F3-C800-4638-8EE0-283D2E161DF7}"/>
+              </a:ext>
+            </a:extLst>
+          </p:cNvPr>
+          <p:cNvPicPr>
+            <a:picLocks noChangeAspect="1"/>
+          </p:cNvPicPr>
+          <p:nvPr/>
+        </p:nvPicPr>
+        <p:blipFill>
+          <a:blip r:embed="rId2"/>
+          <a:stretch>
+            <a:fillRect/>
+          </a:stretch>
+        </p:blipFill>
+        <p:spPr>
+          <a:xfrm>
+            <a:off x="1386028" y="1772789"/>
+            <a:ext cx="3729035" cy="4412907"/>
+          </a:xfrm>
+          <a:prstGeom prst="rect">
+            <a:avLst/>
+          </a:prstGeom>
+        </p:spPr>
+      </p:pic>
+      <p:pic>
+        <p:nvPicPr>
+          <p:cNvPr id="9" name="그림 8">
+            <a:extLst>
+              <a:ext uri="{FF2B5EF4-FFF2-40B4-BE49-F238E27FC236}">
+                <a16:creationId xmlns:a16="http://schemas.microsoft.com/office/drawing/2014/main" id="{C2C9D79A-D78D-4E90-9218-A1E1D4220883}"/>
+              </a:ext>
+            </a:extLst>
+          </p:cNvPr>
+          <p:cNvPicPr>
+            <a:picLocks noChangeAspect="1"/>
+          </p:cNvPicPr>
+          <p:nvPr/>
+        </p:nvPicPr>
+        <p:blipFill>
+          <a:blip r:embed="rId3"/>
+          <a:stretch>
+            <a:fillRect/>
+          </a:stretch>
+        </p:blipFill>
+        <p:spPr>
+          <a:xfrm>
+            <a:off x="6149647" y="1656661"/>
+            <a:ext cx="5387920" cy="4645165"/>
+          </a:xfrm>
+          <a:prstGeom prst="rect">
+            <a:avLst/>
+          </a:prstGeom>
+        </p:spPr>
+      </p:pic>
+    </p:spTree>
+    <p:extLst>
+      <p:ext uri="{BB962C8B-B14F-4D97-AF65-F5344CB8AC3E}">
+        <p14:creationId xmlns:p14="http://schemas.microsoft.com/office/powerpoint/2010/main" val="1783007187"/>
+      </p:ext>
+    </p:extLst>
+  </p:cSld>
+  <p:clrMapOvr>
+    <a:masterClrMapping/>
+  </p:clrMapOvr>
+</p:sld>
+</file>
+
+<file path=ppt/slides/slide18.xml><?xml version="1.0" encoding="utf-8"?>
+<p:sld xmlns:a="http://schemas.openxmlformats.org/drawingml/2006/main" xmlns:r="http://schemas.openxmlformats.org/officeDocument/2006/relationships" xmlns:p="http://schemas.openxmlformats.org/presentationml/2006/main">
+  <p:cSld>
+    <p:spTree>
+      <p:nvGrpSpPr>
+        <p:cNvPr id="1" name=""/>
+        <p:cNvGrpSpPr/>
+        <p:nvPr/>
+      </p:nvGrpSpPr>
+      <p:grpSpPr>
+        <a:xfrm>
+          <a:off x="0" y="0"/>
+          <a:ext cx="0" cy="0"/>
+          <a:chOff x="0" y="0"/>
+          <a:chExt cx="0" cy="0"/>
+        </a:xfrm>
+      </p:grpSpPr>
+      <p:sp>
+        <p:nvSpPr>
+          <p:cNvPr id="2" name="제목 1">
+            <a:extLst>
+              <a:ext uri="{FF2B5EF4-FFF2-40B4-BE49-F238E27FC236}">
+                <a16:creationId xmlns:a16="http://schemas.microsoft.com/office/drawing/2014/main" id="{93EC9EF1-25B2-470B-8958-64B218A29447}"/>
+              </a:ext>
+            </a:extLst>
+          </p:cNvPr>
+          <p:cNvSpPr>
+            <a:spLocks noGrp="1"/>
+          </p:cNvSpPr>
+          <p:nvPr>
+            <p:ph type="title"/>
+          </p:nvPr>
+        </p:nvSpPr>
+        <p:spPr/>
+        <p:txBody>
+          <a:bodyPr>
+            <a:normAutofit fontScale="90000"/>
+          </a:bodyPr>
+          <a:lstStyle/>
+          <a:p>
+            <a:r>
+              <a:rPr lang="en-US" altLang="ko-KR" dirty="0"/>
+              <a:t>Camera API </a:t>
+            </a:r>
+            <a:r>
+              <a:rPr lang="ko-KR" altLang="en-US" dirty="0"/>
+              <a:t>기반 </a:t>
+            </a:r>
+            <a:r>
+              <a:rPr lang="en-US" altLang="ko-KR" dirty="0"/>
+              <a:t>OpenCV </a:t>
+            </a:r>
+            <a:r>
+              <a:rPr lang="ko-KR" altLang="en-US" dirty="0"/>
+              <a:t>영상처리</a:t>
+            </a:r>
+          </a:p>
+        </p:txBody>
+      </p:sp>
+      <p:sp>
+        <p:nvSpPr>
+          <p:cNvPr id="3" name="내용 개체 틀 2">
+            <a:extLst>
+              <a:ext uri="{FF2B5EF4-FFF2-40B4-BE49-F238E27FC236}">
+                <a16:creationId xmlns:a16="http://schemas.microsoft.com/office/drawing/2014/main" id="{3AE5EED4-91BA-44E1-9311-944BA85AD85D}"/>
+              </a:ext>
+            </a:extLst>
+          </p:cNvPr>
+          <p:cNvSpPr>
+            <a:spLocks noGrp="1"/>
+          </p:cNvSpPr>
+          <p:nvPr>
+            <p:ph idx="1"/>
+          </p:nvPr>
+        </p:nvSpPr>
+        <p:spPr/>
+        <p:txBody>
+          <a:bodyPr>
+            <a:normAutofit fontScale="85000" lnSpcReduction="20000"/>
+          </a:bodyPr>
+          <a:lstStyle/>
+          <a:p>
+            <a:r>
+              <a:rPr lang="ko-KR" altLang="en-US" dirty="0"/>
+              <a:t>예제 코드</a:t>
+            </a:r>
+          </a:p>
+        </p:txBody>
+      </p:sp>
+      <p:sp>
+        <p:nvSpPr>
+          <p:cNvPr id="4" name="텍스트 개체 틀 3">
+            <a:extLst>
+              <a:ext uri="{FF2B5EF4-FFF2-40B4-BE49-F238E27FC236}">
+                <a16:creationId xmlns:a16="http://schemas.microsoft.com/office/drawing/2014/main" id="{92BAEDC0-2F4D-4109-AAF6-73297C38FC55}"/>
+              </a:ext>
+            </a:extLst>
+          </p:cNvPr>
+          <p:cNvSpPr>
+            <a:spLocks noGrp="1"/>
+          </p:cNvSpPr>
+          <p:nvPr>
+            <p:ph type="body" sz="quarter" idx="13"/>
+          </p:nvPr>
+        </p:nvSpPr>
+        <p:spPr/>
+        <p:txBody>
+          <a:bodyPr/>
+          <a:lstStyle/>
+          <a:p>
+            <a:r>
+              <a:rPr lang="en-US" altLang="ko-KR" dirty="0"/>
+              <a:t>02</a:t>
+            </a:r>
+            <a:endParaRPr lang="ko-KR" altLang="en-US" dirty="0"/>
+          </a:p>
+        </p:txBody>
+      </p:sp>
+      <p:sp>
+        <p:nvSpPr>
+          <p:cNvPr id="15" name="슬라이드 번호 개체 틀 14">
+            <a:extLst>
+              <a:ext uri="{FF2B5EF4-FFF2-40B4-BE49-F238E27FC236}">
+                <a16:creationId xmlns:a16="http://schemas.microsoft.com/office/drawing/2014/main" id="{79B9229E-D7CD-40C2-B26F-0BF4AC1E9E93}"/>
+              </a:ext>
+            </a:extLst>
+          </p:cNvPr>
+          <p:cNvSpPr>
+            <a:spLocks noGrp="1"/>
+          </p:cNvSpPr>
+          <p:nvPr>
+            <p:ph type="sldNum" sz="quarter" idx="12"/>
+          </p:nvPr>
+        </p:nvSpPr>
+        <p:spPr/>
+        <p:txBody>
+          <a:bodyPr/>
+          <a:lstStyle/>
+          <a:p>
+            <a:fld id="{28033542-72CD-49C1-9B51-668B00668B43}" type="slidenum">
+              <a:rPr lang="ko-KR" altLang="en-US" smtClean="0"/>
+              <a:t>18</a:t>
+            </a:fld>
+            <a:endParaRPr lang="ko-KR" altLang="en-US"/>
+          </a:p>
+        </p:txBody>
+      </p:sp>
+      <p:sp>
+        <p:nvSpPr>
+          <p:cNvPr id="13" name="TextBox 12">
+            <a:extLst>
+              <a:ext uri="{FF2B5EF4-FFF2-40B4-BE49-F238E27FC236}">
+                <a16:creationId xmlns:a16="http://schemas.microsoft.com/office/drawing/2014/main" id="{E2D893D9-3930-4552-9C6B-0E0B88029121}"/>
+              </a:ext>
+            </a:extLst>
+          </p:cNvPr>
+          <p:cNvSpPr txBox="1"/>
+          <p:nvPr/>
+        </p:nvSpPr>
+        <p:spPr>
+          <a:xfrm>
+            <a:off x="700897" y="1140473"/>
+            <a:ext cx="10368722" cy="461665"/>
+          </a:xfrm>
+          <a:prstGeom prst="rect">
+            <a:avLst/>
+          </a:prstGeom>
+          <a:noFill/>
+        </p:spPr>
+        <p:txBody>
+          <a:bodyPr wrap="square" rtlCol="0">
+            <a:spAutoFit/>
+          </a:bodyPr>
+          <a:lstStyle/>
+          <a:p>
+            <a:pPr marL="285750" indent="-285750">
+              <a:buFont typeface="Arial" panose="020B0604020202020204" pitchFamily="34" charset="0"/>
+              <a:buChar char="•"/>
+            </a:pPr>
+            <a:r>
+              <a:rPr lang="ko-KR" altLang="en-US" sz="2400" dirty="0"/>
+              <a:t>수정되는 부분 </a:t>
+            </a:r>
+            <a:r>
+              <a:rPr lang="en-US" altLang="ko-KR" sz="2400" dirty="0"/>
+              <a:t>(Layout)</a:t>
+            </a:r>
+          </a:p>
+        </p:txBody>
+      </p:sp>
+      <p:pic>
+        <p:nvPicPr>
+          <p:cNvPr id="7" name="그림 6">
+            <a:extLst>
+              <a:ext uri="{FF2B5EF4-FFF2-40B4-BE49-F238E27FC236}">
+                <a16:creationId xmlns:a16="http://schemas.microsoft.com/office/drawing/2014/main" id="{5556B0DE-5DAC-41C2-AD72-0A0A02CCBA4A}"/>
+              </a:ext>
+            </a:extLst>
+          </p:cNvPr>
+          <p:cNvPicPr>
+            <a:picLocks noChangeAspect="1"/>
+          </p:cNvPicPr>
+          <p:nvPr/>
+        </p:nvPicPr>
+        <p:blipFill>
+          <a:blip r:embed="rId2"/>
+          <a:stretch>
+            <a:fillRect/>
+          </a:stretch>
+        </p:blipFill>
+        <p:spPr>
+          <a:xfrm>
+            <a:off x="3952875" y="1985962"/>
+            <a:ext cx="4286250" cy="2886075"/>
+          </a:xfrm>
+          <a:prstGeom prst="rect">
+            <a:avLst/>
+          </a:prstGeom>
+        </p:spPr>
+      </p:pic>
+    </p:spTree>
+    <p:extLst>
+      <p:ext uri="{BB962C8B-B14F-4D97-AF65-F5344CB8AC3E}">
+        <p14:creationId xmlns:p14="http://schemas.microsoft.com/office/powerpoint/2010/main" val="1728701989"/>
+      </p:ext>
+    </p:extLst>
+  </p:cSld>
+  <p:clrMapOvr>
+    <a:masterClrMapping/>
+  </p:clrMapOvr>
+</p:sld>
+</file>
+
+<file path=ppt/slides/slide19.xml><?xml version="1.0" encoding="utf-8"?>
+<p:sld xmlns:a="http://schemas.openxmlformats.org/drawingml/2006/main" xmlns:r="http://schemas.openxmlformats.org/officeDocument/2006/relationships" xmlns:p="http://schemas.openxmlformats.org/presentationml/2006/main">
+  <p:cSld>
+    <p:spTree>
+      <p:nvGrpSpPr>
+        <p:cNvPr id="1" name=""/>
+        <p:cNvGrpSpPr/>
+        <p:nvPr/>
+      </p:nvGrpSpPr>
+      <p:grpSpPr>
+        <a:xfrm>
+          <a:off x="0" y="0"/>
+          <a:ext cx="0" cy="0"/>
+          <a:chOff x="0" y="0"/>
+          <a:chExt cx="0" cy="0"/>
+        </a:xfrm>
+      </p:grpSpPr>
+      <p:sp>
+        <p:nvSpPr>
+          <p:cNvPr id="2" name="제목 1">
+            <a:extLst>
+              <a:ext uri="{FF2B5EF4-FFF2-40B4-BE49-F238E27FC236}">
+                <a16:creationId xmlns:a16="http://schemas.microsoft.com/office/drawing/2014/main" id="{93EC9EF1-25B2-470B-8958-64B218A29447}"/>
+              </a:ext>
+            </a:extLst>
+          </p:cNvPr>
+          <p:cNvSpPr>
+            <a:spLocks noGrp="1"/>
+          </p:cNvSpPr>
+          <p:nvPr>
+            <p:ph type="title"/>
+          </p:nvPr>
+        </p:nvSpPr>
+        <p:spPr/>
+        <p:txBody>
+          <a:bodyPr>
+            <a:normAutofit fontScale="90000"/>
+          </a:bodyPr>
+          <a:lstStyle/>
+          <a:p>
+            <a:r>
+              <a:rPr lang="en-US" altLang="ko-KR" dirty="0"/>
+              <a:t>Camera API </a:t>
+            </a:r>
+            <a:r>
+              <a:rPr lang="ko-KR" altLang="en-US" dirty="0"/>
+              <a:t>기반 </a:t>
+            </a:r>
+            <a:r>
+              <a:rPr lang="en-US" altLang="ko-KR" dirty="0"/>
+              <a:t>OpenCV </a:t>
+            </a:r>
+            <a:r>
+              <a:rPr lang="ko-KR" altLang="en-US" dirty="0"/>
+              <a:t>영상처리</a:t>
+            </a:r>
+          </a:p>
+        </p:txBody>
+      </p:sp>
+      <p:sp>
+        <p:nvSpPr>
+          <p:cNvPr id="3" name="내용 개체 틀 2">
+            <a:extLst>
+              <a:ext uri="{FF2B5EF4-FFF2-40B4-BE49-F238E27FC236}">
+                <a16:creationId xmlns:a16="http://schemas.microsoft.com/office/drawing/2014/main" id="{3AE5EED4-91BA-44E1-9311-944BA85AD85D}"/>
+              </a:ext>
+            </a:extLst>
+          </p:cNvPr>
+          <p:cNvSpPr>
+            <a:spLocks noGrp="1"/>
+          </p:cNvSpPr>
+          <p:nvPr>
+            <p:ph idx="1"/>
+          </p:nvPr>
+        </p:nvSpPr>
+        <p:spPr/>
+        <p:txBody>
+          <a:bodyPr>
+            <a:normAutofit fontScale="85000" lnSpcReduction="20000"/>
+          </a:bodyPr>
+          <a:lstStyle/>
+          <a:p>
+            <a:r>
+              <a:rPr lang="ko-KR" altLang="en-US" dirty="0"/>
+              <a:t>예제 코드</a:t>
+            </a:r>
+          </a:p>
+        </p:txBody>
+      </p:sp>
+      <p:sp>
+        <p:nvSpPr>
+          <p:cNvPr id="4" name="텍스트 개체 틀 3">
+            <a:extLst>
+              <a:ext uri="{FF2B5EF4-FFF2-40B4-BE49-F238E27FC236}">
+                <a16:creationId xmlns:a16="http://schemas.microsoft.com/office/drawing/2014/main" id="{92BAEDC0-2F4D-4109-AAF6-73297C38FC55}"/>
+              </a:ext>
+            </a:extLst>
+          </p:cNvPr>
+          <p:cNvSpPr>
+            <a:spLocks noGrp="1"/>
+          </p:cNvSpPr>
+          <p:nvPr>
+            <p:ph type="body" sz="quarter" idx="13"/>
+          </p:nvPr>
+        </p:nvSpPr>
+        <p:spPr/>
+        <p:txBody>
+          <a:bodyPr/>
+          <a:lstStyle/>
+          <a:p>
+            <a:r>
+              <a:rPr lang="en-US" altLang="ko-KR" dirty="0"/>
+              <a:t>02</a:t>
+            </a:r>
+            <a:endParaRPr lang="ko-KR" altLang="en-US" dirty="0"/>
+          </a:p>
+        </p:txBody>
+      </p:sp>
+      <p:sp>
+        <p:nvSpPr>
+          <p:cNvPr id="15" name="슬라이드 번호 개체 틀 14">
+            <a:extLst>
+              <a:ext uri="{FF2B5EF4-FFF2-40B4-BE49-F238E27FC236}">
+                <a16:creationId xmlns:a16="http://schemas.microsoft.com/office/drawing/2014/main" id="{79B9229E-D7CD-40C2-B26F-0BF4AC1E9E93}"/>
+              </a:ext>
+            </a:extLst>
+          </p:cNvPr>
+          <p:cNvSpPr>
+            <a:spLocks noGrp="1"/>
+          </p:cNvSpPr>
+          <p:nvPr>
+            <p:ph type="sldNum" sz="quarter" idx="12"/>
+          </p:nvPr>
+        </p:nvSpPr>
+        <p:spPr/>
+        <p:txBody>
+          <a:bodyPr/>
+          <a:lstStyle/>
+          <a:p>
+            <a:fld id="{28033542-72CD-49C1-9B51-668B00668B43}" type="slidenum">
+              <a:rPr lang="ko-KR" altLang="en-US" smtClean="0"/>
+              <a:t>19</a:t>
+            </a:fld>
+            <a:endParaRPr lang="ko-KR" altLang="en-US"/>
+          </a:p>
+        </p:txBody>
+      </p:sp>
+      <p:sp>
+        <p:nvSpPr>
+          <p:cNvPr id="13" name="TextBox 12">
+            <a:extLst>
+              <a:ext uri="{FF2B5EF4-FFF2-40B4-BE49-F238E27FC236}">
+                <a16:creationId xmlns:a16="http://schemas.microsoft.com/office/drawing/2014/main" id="{E2D893D9-3930-4552-9C6B-0E0B88029121}"/>
+              </a:ext>
+            </a:extLst>
+          </p:cNvPr>
+          <p:cNvSpPr txBox="1"/>
+          <p:nvPr/>
+        </p:nvSpPr>
+        <p:spPr>
+          <a:xfrm>
+            <a:off x="700897" y="1140473"/>
+            <a:ext cx="10368722" cy="461665"/>
+          </a:xfrm>
+          <a:prstGeom prst="rect">
+            <a:avLst/>
+          </a:prstGeom>
+          <a:noFill/>
+        </p:spPr>
+        <p:txBody>
+          <a:bodyPr wrap="square" rtlCol="0">
+            <a:spAutoFit/>
+          </a:bodyPr>
+          <a:lstStyle/>
+          <a:p>
+            <a:pPr marL="285750" indent="-285750">
+              <a:buFont typeface="Arial" panose="020B0604020202020204" pitchFamily="34" charset="0"/>
+              <a:buChar char="•"/>
+            </a:pPr>
+            <a:r>
+              <a:rPr lang="ko-KR" altLang="en-US" sz="2400" dirty="0"/>
+              <a:t>수정되는 부분 </a:t>
+            </a:r>
+            <a:r>
+              <a:rPr lang="en-US" altLang="ko-KR" sz="2400" dirty="0"/>
+              <a:t>(</a:t>
+            </a:r>
+            <a:r>
+              <a:rPr lang="en-US" altLang="ko-KR" sz="2400" dirty="0" err="1"/>
+              <a:t>MainActivity</a:t>
+            </a:r>
+            <a:r>
+              <a:rPr lang="en-US" altLang="ko-KR" sz="2400" dirty="0"/>
+              <a:t>)</a:t>
+            </a:r>
+          </a:p>
+        </p:txBody>
+      </p:sp>
+      <p:pic>
+        <p:nvPicPr>
+          <p:cNvPr id="6" name="그림 5">
+            <a:extLst>
+              <a:ext uri="{FF2B5EF4-FFF2-40B4-BE49-F238E27FC236}">
+                <a16:creationId xmlns:a16="http://schemas.microsoft.com/office/drawing/2014/main" id="{AF9010C8-69A5-445B-B8EF-B2DA2068F625}"/>
+              </a:ext>
+            </a:extLst>
+          </p:cNvPr>
+          <p:cNvPicPr>
+            <a:picLocks noChangeAspect="1"/>
+          </p:cNvPicPr>
+          <p:nvPr/>
+        </p:nvPicPr>
+        <p:blipFill>
+          <a:blip r:embed="rId2"/>
+          <a:stretch>
+            <a:fillRect/>
+          </a:stretch>
+        </p:blipFill>
+        <p:spPr>
+          <a:xfrm>
+            <a:off x="3605212" y="2309812"/>
+            <a:ext cx="4981575" cy="2238375"/>
+          </a:xfrm>
+          <a:prstGeom prst="rect">
+            <a:avLst/>
+          </a:prstGeom>
+        </p:spPr>
+      </p:pic>
+    </p:spTree>
+    <p:extLst>
+      <p:ext uri="{BB962C8B-B14F-4D97-AF65-F5344CB8AC3E}">
+        <p14:creationId xmlns:p14="http://schemas.microsoft.com/office/powerpoint/2010/main" val="2001016971"/>
       </p:ext>
     </p:extLst>
   </p:cSld>
@@ -6120,6 +7235,563 @@
 </p:sld>
 </file>
 
+<file path=ppt/slides/slide20.xml><?xml version="1.0" encoding="utf-8"?>
+<p:sld xmlns:a="http://schemas.openxmlformats.org/drawingml/2006/main" xmlns:r="http://schemas.openxmlformats.org/officeDocument/2006/relationships" xmlns:p="http://schemas.openxmlformats.org/presentationml/2006/main">
+  <p:cSld>
+    <p:spTree>
+      <p:nvGrpSpPr>
+        <p:cNvPr id="1" name=""/>
+        <p:cNvGrpSpPr/>
+        <p:nvPr/>
+      </p:nvGrpSpPr>
+      <p:grpSpPr>
+        <a:xfrm>
+          <a:off x="0" y="0"/>
+          <a:ext cx="0" cy="0"/>
+          <a:chOff x="0" y="0"/>
+          <a:chExt cx="0" cy="0"/>
+        </a:xfrm>
+      </p:grpSpPr>
+      <p:sp>
+        <p:nvSpPr>
+          <p:cNvPr id="2" name="제목 1">
+            <a:extLst>
+              <a:ext uri="{FF2B5EF4-FFF2-40B4-BE49-F238E27FC236}">
+                <a16:creationId xmlns:a16="http://schemas.microsoft.com/office/drawing/2014/main" id="{93EC9EF1-25B2-470B-8958-64B218A29447}"/>
+              </a:ext>
+            </a:extLst>
+          </p:cNvPr>
+          <p:cNvSpPr>
+            <a:spLocks noGrp="1"/>
+          </p:cNvSpPr>
+          <p:nvPr>
+            <p:ph type="title"/>
+          </p:nvPr>
+        </p:nvSpPr>
+        <p:spPr/>
+        <p:txBody>
+          <a:bodyPr>
+            <a:normAutofit fontScale="90000"/>
+          </a:bodyPr>
+          <a:lstStyle/>
+          <a:p>
+            <a:r>
+              <a:rPr lang="en-US" altLang="ko-KR" dirty="0"/>
+              <a:t>Camera API </a:t>
+            </a:r>
+            <a:r>
+              <a:rPr lang="ko-KR" altLang="en-US" dirty="0"/>
+              <a:t>기반 </a:t>
+            </a:r>
+            <a:r>
+              <a:rPr lang="en-US" altLang="ko-KR" dirty="0"/>
+              <a:t>OpenCV </a:t>
+            </a:r>
+            <a:r>
+              <a:rPr lang="ko-KR" altLang="en-US" dirty="0"/>
+              <a:t>영상처리</a:t>
+            </a:r>
+          </a:p>
+        </p:txBody>
+      </p:sp>
+      <p:sp>
+        <p:nvSpPr>
+          <p:cNvPr id="3" name="내용 개체 틀 2">
+            <a:extLst>
+              <a:ext uri="{FF2B5EF4-FFF2-40B4-BE49-F238E27FC236}">
+                <a16:creationId xmlns:a16="http://schemas.microsoft.com/office/drawing/2014/main" id="{3AE5EED4-91BA-44E1-9311-944BA85AD85D}"/>
+              </a:ext>
+            </a:extLst>
+          </p:cNvPr>
+          <p:cNvSpPr>
+            <a:spLocks noGrp="1"/>
+          </p:cNvSpPr>
+          <p:nvPr>
+            <p:ph idx="1"/>
+          </p:nvPr>
+        </p:nvSpPr>
+        <p:spPr/>
+        <p:txBody>
+          <a:bodyPr>
+            <a:normAutofit fontScale="85000" lnSpcReduction="20000"/>
+          </a:bodyPr>
+          <a:lstStyle/>
+          <a:p>
+            <a:r>
+              <a:rPr lang="ko-KR" altLang="en-US" dirty="0"/>
+              <a:t>예제 코드</a:t>
+            </a:r>
+          </a:p>
+        </p:txBody>
+      </p:sp>
+      <p:sp>
+        <p:nvSpPr>
+          <p:cNvPr id="4" name="텍스트 개체 틀 3">
+            <a:extLst>
+              <a:ext uri="{FF2B5EF4-FFF2-40B4-BE49-F238E27FC236}">
+                <a16:creationId xmlns:a16="http://schemas.microsoft.com/office/drawing/2014/main" id="{92BAEDC0-2F4D-4109-AAF6-73297C38FC55}"/>
+              </a:ext>
+            </a:extLst>
+          </p:cNvPr>
+          <p:cNvSpPr>
+            <a:spLocks noGrp="1"/>
+          </p:cNvSpPr>
+          <p:nvPr>
+            <p:ph type="body" sz="quarter" idx="13"/>
+          </p:nvPr>
+        </p:nvSpPr>
+        <p:spPr/>
+        <p:txBody>
+          <a:bodyPr/>
+          <a:lstStyle/>
+          <a:p>
+            <a:r>
+              <a:rPr lang="en-US" altLang="ko-KR" dirty="0"/>
+              <a:t>02</a:t>
+            </a:r>
+            <a:endParaRPr lang="ko-KR" altLang="en-US" dirty="0"/>
+          </a:p>
+        </p:txBody>
+      </p:sp>
+      <p:sp>
+        <p:nvSpPr>
+          <p:cNvPr id="15" name="슬라이드 번호 개체 틀 14">
+            <a:extLst>
+              <a:ext uri="{FF2B5EF4-FFF2-40B4-BE49-F238E27FC236}">
+                <a16:creationId xmlns:a16="http://schemas.microsoft.com/office/drawing/2014/main" id="{79B9229E-D7CD-40C2-B26F-0BF4AC1E9E93}"/>
+              </a:ext>
+            </a:extLst>
+          </p:cNvPr>
+          <p:cNvSpPr>
+            <a:spLocks noGrp="1"/>
+          </p:cNvSpPr>
+          <p:nvPr>
+            <p:ph type="sldNum" sz="quarter" idx="12"/>
+          </p:nvPr>
+        </p:nvSpPr>
+        <p:spPr/>
+        <p:txBody>
+          <a:bodyPr/>
+          <a:lstStyle/>
+          <a:p>
+            <a:fld id="{28033542-72CD-49C1-9B51-668B00668B43}" type="slidenum">
+              <a:rPr lang="ko-KR" altLang="en-US" smtClean="0"/>
+              <a:t>20</a:t>
+            </a:fld>
+            <a:endParaRPr lang="ko-KR" altLang="en-US"/>
+          </a:p>
+        </p:txBody>
+      </p:sp>
+      <p:sp>
+        <p:nvSpPr>
+          <p:cNvPr id="13" name="TextBox 12">
+            <a:extLst>
+              <a:ext uri="{FF2B5EF4-FFF2-40B4-BE49-F238E27FC236}">
+                <a16:creationId xmlns:a16="http://schemas.microsoft.com/office/drawing/2014/main" id="{E2D893D9-3930-4552-9C6B-0E0B88029121}"/>
+              </a:ext>
+            </a:extLst>
+          </p:cNvPr>
+          <p:cNvSpPr txBox="1"/>
+          <p:nvPr/>
+        </p:nvSpPr>
+        <p:spPr>
+          <a:xfrm>
+            <a:off x="700897" y="1140473"/>
+            <a:ext cx="10368722" cy="461665"/>
+          </a:xfrm>
+          <a:prstGeom prst="rect">
+            <a:avLst/>
+          </a:prstGeom>
+          <a:noFill/>
+        </p:spPr>
+        <p:txBody>
+          <a:bodyPr wrap="square" rtlCol="0">
+            <a:spAutoFit/>
+          </a:bodyPr>
+          <a:lstStyle/>
+          <a:p>
+            <a:pPr marL="285750" indent="-285750">
+              <a:buFont typeface="Arial" panose="020B0604020202020204" pitchFamily="34" charset="0"/>
+              <a:buChar char="•"/>
+            </a:pPr>
+            <a:r>
+              <a:rPr lang="ko-KR" altLang="en-US" sz="2400" dirty="0"/>
+              <a:t>수정되는 부분 </a:t>
+            </a:r>
+            <a:r>
+              <a:rPr lang="en-US" altLang="ko-KR" sz="2400" dirty="0"/>
+              <a:t>(</a:t>
+            </a:r>
+            <a:r>
+              <a:rPr lang="en-US" altLang="ko-KR" sz="2400" dirty="0" err="1"/>
+              <a:t>MyCameraManager</a:t>
+            </a:r>
+            <a:r>
+              <a:rPr lang="en-US" altLang="ko-KR" sz="2400" dirty="0"/>
+              <a:t>)</a:t>
+            </a:r>
+          </a:p>
+        </p:txBody>
+      </p:sp>
+      <p:pic>
+        <p:nvPicPr>
+          <p:cNvPr id="7" name="그림 6">
+            <a:extLst>
+              <a:ext uri="{FF2B5EF4-FFF2-40B4-BE49-F238E27FC236}">
+                <a16:creationId xmlns:a16="http://schemas.microsoft.com/office/drawing/2014/main" id="{C4E9A6FF-AA06-4512-B9E8-EB8D48E23CDD}"/>
+              </a:ext>
+            </a:extLst>
+          </p:cNvPr>
+          <p:cNvPicPr>
+            <a:picLocks noChangeAspect="1"/>
+          </p:cNvPicPr>
+          <p:nvPr/>
+        </p:nvPicPr>
+        <p:blipFill>
+          <a:blip r:embed="rId2"/>
+          <a:stretch>
+            <a:fillRect/>
+          </a:stretch>
+        </p:blipFill>
+        <p:spPr>
+          <a:xfrm>
+            <a:off x="3475016" y="2238239"/>
+            <a:ext cx="5241968" cy="3207771"/>
+          </a:xfrm>
+          <a:prstGeom prst="rect">
+            <a:avLst/>
+          </a:prstGeom>
+        </p:spPr>
+      </p:pic>
+    </p:spTree>
+    <p:extLst>
+      <p:ext uri="{BB962C8B-B14F-4D97-AF65-F5344CB8AC3E}">
+        <p14:creationId xmlns:p14="http://schemas.microsoft.com/office/powerpoint/2010/main" val="3032558891"/>
+      </p:ext>
+    </p:extLst>
+  </p:cSld>
+  <p:clrMapOvr>
+    <a:masterClrMapping/>
+  </p:clrMapOvr>
+</p:sld>
+</file>
+
+<file path=ppt/slides/slide21.xml><?xml version="1.0" encoding="utf-8"?>
+<p:sld xmlns:a="http://schemas.openxmlformats.org/drawingml/2006/main" xmlns:r="http://schemas.openxmlformats.org/officeDocument/2006/relationships" xmlns:p="http://schemas.openxmlformats.org/presentationml/2006/main">
+  <p:cSld>
+    <p:spTree>
+      <p:nvGrpSpPr>
+        <p:cNvPr id="1" name=""/>
+        <p:cNvGrpSpPr/>
+        <p:nvPr/>
+      </p:nvGrpSpPr>
+      <p:grpSpPr>
+        <a:xfrm>
+          <a:off x="0" y="0"/>
+          <a:ext cx="0" cy="0"/>
+          <a:chOff x="0" y="0"/>
+          <a:chExt cx="0" cy="0"/>
+        </a:xfrm>
+      </p:grpSpPr>
+      <p:sp>
+        <p:nvSpPr>
+          <p:cNvPr id="2" name="제목 1">
+            <a:extLst>
+              <a:ext uri="{FF2B5EF4-FFF2-40B4-BE49-F238E27FC236}">
+                <a16:creationId xmlns:a16="http://schemas.microsoft.com/office/drawing/2014/main" id="{93EC9EF1-25B2-470B-8958-64B218A29447}"/>
+              </a:ext>
+            </a:extLst>
+          </p:cNvPr>
+          <p:cNvSpPr>
+            <a:spLocks noGrp="1"/>
+          </p:cNvSpPr>
+          <p:nvPr>
+            <p:ph type="title"/>
+          </p:nvPr>
+        </p:nvSpPr>
+        <p:spPr/>
+        <p:txBody>
+          <a:bodyPr>
+            <a:normAutofit fontScale="90000"/>
+          </a:bodyPr>
+          <a:lstStyle/>
+          <a:p>
+            <a:r>
+              <a:rPr lang="en-US" altLang="ko-KR" dirty="0"/>
+              <a:t>Camera API </a:t>
+            </a:r>
+            <a:r>
+              <a:rPr lang="ko-KR" altLang="en-US" dirty="0"/>
+              <a:t>기반 </a:t>
+            </a:r>
+            <a:r>
+              <a:rPr lang="en-US" altLang="ko-KR" dirty="0"/>
+              <a:t>OpenCV </a:t>
+            </a:r>
+            <a:r>
+              <a:rPr lang="ko-KR" altLang="en-US" dirty="0"/>
+              <a:t>영상처리</a:t>
+            </a:r>
+          </a:p>
+        </p:txBody>
+      </p:sp>
+      <p:sp>
+        <p:nvSpPr>
+          <p:cNvPr id="3" name="내용 개체 틀 2">
+            <a:extLst>
+              <a:ext uri="{FF2B5EF4-FFF2-40B4-BE49-F238E27FC236}">
+                <a16:creationId xmlns:a16="http://schemas.microsoft.com/office/drawing/2014/main" id="{3AE5EED4-91BA-44E1-9311-944BA85AD85D}"/>
+              </a:ext>
+            </a:extLst>
+          </p:cNvPr>
+          <p:cNvSpPr>
+            <a:spLocks noGrp="1"/>
+          </p:cNvSpPr>
+          <p:nvPr>
+            <p:ph idx="1"/>
+          </p:nvPr>
+        </p:nvSpPr>
+        <p:spPr/>
+        <p:txBody>
+          <a:bodyPr>
+            <a:normAutofit fontScale="85000" lnSpcReduction="20000"/>
+          </a:bodyPr>
+          <a:lstStyle/>
+          <a:p>
+            <a:r>
+              <a:rPr lang="ko-KR" altLang="en-US" dirty="0"/>
+              <a:t>예제 코드</a:t>
+            </a:r>
+          </a:p>
+        </p:txBody>
+      </p:sp>
+      <p:sp>
+        <p:nvSpPr>
+          <p:cNvPr id="4" name="텍스트 개체 틀 3">
+            <a:extLst>
+              <a:ext uri="{FF2B5EF4-FFF2-40B4-BE49-F238E27FC236}">
+                <a16:creationId xmlns:a16="http://schemas.microsoft.com/office/drawing/2014/main" id="{92BAEDC0-2F4D-4109-AAF6-73297C38FC55}"/>
+              </a:ext>
+            </a:extLst>
+          </p:cNvPr>
+          <p:cNvSpPr>
+            <a:spLocks noGrp="1"/>
+          </p:cNvSpPr>
+          <p:nvPr>
+            <p:ph type="body" sz="quarter" idx="13"/>
+          </p:nvPr>
+        </p:nvSpPr>
+        <p:spPr/>
+        <p:txBody>
+          <a:bodyPr/>
+          <a:lstStyle/>
+          <a:p>
+            <a:r>
+              <a:rPr lang="en-US" altLang="ko-KR" dirty="0"/>
+              <a:t>02</a:t>
+            </a:r>
+            <a:endParaRPr lang="ko-KR" altLang="en-US" dirty="0"/>
+          </a:p>
+        </p:txBody>
+      </p:sp>
+      <p:sp>
+        <p:nvSpPr>
+          <p:cNvPr id="15" name="슬라이드 번호 개체 틀 14">
+            <a:extLst>
+              <a:ext uri="{FF2B5EF4-FFF2-40B4-BE49-F238E27FC236}">
+                <a16:creationId xmlns:a16="http://schemas.microsoft.com/office/drawing/2014/main" id="{79B9229E-D7CD-40C2-B26F-0BF4AC1E9E93}"/>
+              </a:ext>
+            </a:extLst>
+          </p:cNvPr>
+          <p:cNvSpPr>
+            <a:spLocks noGrp="1"/>
+          </p:cNvSpPr>
+          <p:nvPr>
+            <p:ph type="sldNum" sz="quarter" idx="12"/>
+          </p:nvPr>
+        </p:nvSpPr>
+        <p:spPr/>
+        <p:txBody>
+          <a:bodyPr/>
+          <a:lstStyle/>
+          <a:p>
+            <a:fld id="{28033542-72CD-49C1-9B51-668B00668B43}" type="slidenum">
+              <a:rPr lang="ko-KR" altLang="en-US" smtClean="0"/>
+              <a:t>21</a:t>
+            </a:fld>
+            <a:endParaRPr lang="ko-KR" altLang="en-US"/>
+          </a:p>
+        </p:txBody>
+      </p:sp>
+      <p:sp>
+        <p:nvSpPr>
+          <p:cNvPr id="13" name="TextBox 12">
+            <a:extLst>
+              <a:ext uri="{FF2B5EF4-FFF2-40B4-BE49-F238E27FC236}">
+                <a16:creationId xmlns:a16="http://schemas.microsoft.com/office/drawing/2014/main" id="{E2D893D9-3930-4552-9C6B-0E0B88029121}"/>
+              </a:ext>
+            </a:extLst>
+          </p:cNvPr>
+          <p:cNvSpPr txBox="1"/>
+          <p:nvPr/>
+        </p:nvSpPr>
+        <p:spPr>
+          <a:xfrm>
+            <a:off x="700897" y="1140473"/>
+            <a:ext cx="10368722" cy="461665"/>
+          </a:xfrm>
+          <a:prstGeom prst="rect">
+            <a:avLst/>
+          </a:prstGeom>
+          <a:noFill/>
+        </p:spPr>
+        <p:txBody>
+          <a:bodyPr wrap="square" rtlCol="0">
+            <a:spAutoFit/>
+          </a:bodyPr>
+          <a:lstStyle/>
+          <a:p>
+            <a:pPr marL="285750" indent="-285750">
+              <a:buFont typeface="Arial" panose="020B0604020202020204" pitchFamily="34" charset="0"/>
+              <a:buChar char="•"/>
+            </a:pPr>
+            <a:r>
+              <a:rPr lang="ko-KR" altLang="en-US" sz="2400" dirty="0"/>
+              <a:t>수정되는 부분 </a:t>
+            </a:r>
+            <a:r>
+              <a:rPr lang="en-US" altLang="ko-KR" sz="2400" dirty="0"/>
+              <a:t>(</a:t>
+            </a:r>
+            <a:r>
+              <a:rPr lang="en-US" altLang="ko-KR" sz="2400" dirty="0" err="1"/>
+              <a:t>MyCameraManager</a:t>
+            </a:r>
+            <a:r>
+              <a:rPr lang="en-US" altLang="ko-KR" sz="2400" dirty="0"/>
+              <a:t>)</a:t>
+            </a:r>
+          </a:p>
+        </p:txBody>
+      </p:sp>
+      <p:pic>
+        <p:nvPicPr>
+          <p:cNvPr id="7" name="그림 6">
+            <a:extLst>
+              <a:ext uri="{FF2B5EF4-FFF2-40B4-BE49-F238E27FC236}">
+                <a16:creationId xmlns:a16="http://schemas.microsoft.com/office/drawing/2014/main" id="{C4E9A6FF-AA06-4512-B9E8-EB8D48E23CDD}"/>
+              </a:ext>
+            </a:extLst>
+          </p:cNvPr>
+          <p:cNvPicPr>
+            <a:picLocks noChangeAspect="1"/>
+          </p:cNvPicPr>
+          <p:nvPr/>
+        </p:nvPicPr>
+        <p:blipFill>
+          <a:blip r:embed="rId2"/>
+          <a:stretch>
+            <a:fillRect/>
+          </a:stretch>
+        </p:blipFill>
+        <p:spPr>
+          <a:xfrm>
+            <a:off x="3475016" y="2238239"/>
+            <a:ext cx="5241968" cy="3207771"/>
+          </a:xfrm>
+          <a:prstGeom prst="rect">
+            <a:avLst/>
+          </a:prstGeom>
+        </p:spPr>
+      </p:pic>
+    </p:spTree>
+    <p:extLst>
+      <p:ext uri="{BB962C8B-B14F-4D97-AF65-F5344CB8AC3E}">
+        <p14:creationId xmlns:p14="http://schemas.microsoft.com/office/powerpoint/2010/main" val="1040188827"/>
+      </p:ext>
+    </p:extLst>
+  </p:cSld>
+  <p:clrMapOvr>
+    <a:masterClrMapping/>
+  </p:clrMapOvr>
+</p:sld>
+</file>
+
+<file path=ppt/slides/slide22.xml><?xml version="1.0" encoding="utf-8"?>
+<p:sld xmlns:a="http://schemas.openxmlformats.org/drawingml/2006/main" xmlns:r="http://schemas.openxmlformats.org/officeDocument/2006/relationships" xmlns:p="http://schemas.openxmlformats.org/presentationml/2006/main">
+  <p:cSld>
+    <p:spTree>
+      <p:nvGrpSpPr>
+        <p:cNvPr id="1" name=""/>
+        <p:cNvGrpSpPr/>
+        <p:nvPr/>
+      </p:nvGrpSpPr>
+      <p:grpSpPr>
+        <a:xfrm>
+          <a:off x="0" y="0"/>
+          <a:ext cx="0" cy="0"/>
+          <a:chOff x="0" y="0"/>
+          <a:chExt cx="0" cy="0"/>
+        </a:xfrm>
+      </p:grpSpPr>
+      <p:sp>
+        <p:nvSpPr>
+          <p:cNvPr id="2" name="TextBox 1">
+            <a:extLst>
+              <a:ext uri="{FF2B5EF4-FFF2-40B4-BE49-F238E27FC236}">
+                <a16:creationId xmlns:a16="http://schemas.microsoft.com/office/drawing/2014/main" id="{49C98DDA-1AF3-434F-8176-F68A64814597}"/>
+              </a:ext>
+            </a:extLst>
+          </p:cNvPr>
+          <p:cNvSpPr txBox="1"/>
+          <p:nvPr/>
+        </p:nvSpPr>
+        <p:spPr>
+          <a:xfrm>
+            <a:off x="4696082" y="2705725"/>
+            <a:ext cx="2821606" cy="1446550"/>
+          </a:xfrm>
+          <a:prstGeom prst="rect">
+            <a:avLst/>
+          </a:prstGeom>
+          <a:noFill/>
+        </p:spPr>
+        <p:txBody>
+          <a:bodyPr wrap="none" rtlCol="0">
+            <a:spAutoFit/>
+          </a:bodyPr>
+          <a:lstStyle/>
+          <a:p>
+            <a:pPr algn="ctr"/>
+            <a:r>
+              <a:rPr lang="en-US" altLang="ko-KR" sz="8800" b="1" dirty="0">
+                <a:solidFill>
+                  <a:srgbClr val="595959"/>
+                </a:solidFill>
+              </a:rPr>
+              <a:t>Q&amp;A</a:t>
+            </a:r>
+            <a:endParaRPr lang="ko-KR" altLang="en-US" sz="8800" b="1" dirty="0">
+              <a:solidFill>
+                <a:srgbClr val="595959"/>
+              </a:solidFill>
+            </a:endParaRPr>
+          </a:p>
+        </p:txBody>
+      </p:sp>
+    </p:spTree>
+    <p:extLst>
+      <p:ext uri="{BB962C8B-B14F-4D97-AF65-F5344CB8AC3E}">
+        <p14:creationId xmlns:p14="http://schemas.microsoft.com/office/powerpoint/2010/main" val="143865349"/>
+      </p:ext>
+    </p:extLst>
+  </p:cSld>
+  <p:clrMapOvr>
+    <a:masterClrMapping/>
+  </p:clrMapOvr>
+</p:sld>
+</file>
+
 <file path=ppt/slides/slide3.xml><?xml version="1.0" encoding="utf-8"?>
 <p:sld xmlns:a="http://schemas.openxmlformats.org/drawingml/2006/main" xmlns:r="http://schemas.openxmlformats.org/officeDocument/2006/relationships" xmlns:p="http://schemas.openxmlformats.org/presentationml/2006/main">
   <p:cSld>
@@ -6394,10 +8066,9 @@
           <a:lstStyle/>
           <a:p>
             <a:r>
-              <a:rPr lang="en-US" altLang="ko-KR" dirty="0"/>
-              <a:t>Import OpenCV</a:t>
-            </a:r>
-            <a:endParaRPr lang="ko-KR" altLang="en-US" dirty="0"/>
+              <a:rPr lang="ko-KR" altLang="en-US" dirty="0"/>
+              <a:t>예제 코드</a:t>
+            </a:r>
           </a:p>
         </p:txBody>
       </p:sp>
@@ -6625,10 +8296,9 @@
           <a:lstStyle/>
           <a:p>
             <a:r>
-              <a:rPr lang="en-US" altLang="ko-KR" dirty="0"/>
-              <a:t>Import OpenCV</a:t>
-            </a:r>
-            <a:endParaRPr lang="ko-KR" altLang="en-US" dirty="0"/>
+              <a:rPr lang="ko-KR" altLang="en-US" dirty="0"/>
+              <a:t>예제 코드</a:t>
+            </a:r>
           </a:p>
         </p:txBody>
       </p:sp>
@@ -6856,10 +8526,9 @@
           <a:lstStyle/>
           <a:p>
             <a:r>
-              <a:rPr lang="en-US" altLang="ko-KR" dirty="0"/>
-              <a:t>Import OpenCV</a:t>
-            </a:r>
-            <a:endParaRPr lang="ko-KR" altLang="en-US" dirty="0"/>
+              <a:rPr lang="ko-KR" altLang="en-US" dirty="0"/>
+              <a:t>예제 코드</a:t>
+            </a:r>
           </a:p>
         </p:txBody>
       </p:sp>
@@ -7139,10 +8808,9 @@
           <a:lstStyle/>
           <a:p>
             <a:r>
-              <a:rPr lang="en-US" altLang="ko-KR" dirty="0"/>
-              <a:t>Import OpenCV</a:t>
-            </a:r>
-            <a:endParaRPr lang="ko-KR" altLang="en-US" dirty="0"/>
+              <a:rPr lang="ko-KR" altLang="en-US" dirty="0"/>
+              <a:t>예제 코드</a:t>
+            </a:r>
           </a:p>
         </p:txBody>
       </p:sp>
@@ -7526,10 +9194,9 @@
           <a:lstStyle/>
           <a:p>
             <a:r>
-              <a:rPr lang="en-US" altLang="ko-KR" dirty="0"/>
-              <a:t>Import OpenCV</a:t>
-            </a:r>
-            <a:endParaRPr lang="ko-KR" altLang="en-US" dirty="0"/>
+              <a:rPr lang="ko-KR" altLang="en-US" dirty="0"/>
+              <a:t>예제 코드</a:t>
+            </a:r>
           </a:p>
         </p:txBody>
       </p:sp>
@@ -7809,10 +9476,9 @@
           <a:lstStyle/>
           <a:p>
             <a:r>
-              <a:rPr lang="en-US" altLang="ko-KR" dirty="0"/>
-              <a:t>Import OpenCV</a:t>
-            </a:r>
-            <a:endParaRPr lang="ko-KR" altLang="en-US" dirty="0"/>
+              <a:rPr lang="ko-KR" altLang="en-US" dirty="0"/>
+              <a:t>예제 코드</a:t>
+            </a:r>
           </a:p>
         </p:txBody>
       </p:sp>

</xml_diff>